<commit_message>
Improved design of pptx
</commit_message>
<xml_diff>
--- a/datascience_project.pptx
+++ b/datascience_project.pptx
@@ -4142,13 +4142,32 @@
 </file>
 
 <file path=ppt/slides/slide1.xml><?xml version="1.0" encoding="utf-8"?>
-<p:sld xmlns:a="http://schemas.openxmlformats.org/drawingml/2006/main" xmlns:r="http://schemas.openxmlformats.org/officeDocument/2006/relationships" xmlns:p="http://schemas.openxmlformats.org/presentationml/2006/main">
+<p:sld xmlns:a="http://schemas.openxmlformats.org/drawingml/2006/main" xmlns:r="http://schemas.openxmlformats.org/officeDocument/2006/relationships" xmlns:p="http://schemas.openxmlformats.org/presentationml/2006/main" showMasterSp="0">
   <p:cSld>
     <p:bg>
       <p:bgPr>
-        <a:solidFill>
-          <a:schemeClr val="bg1"/>
-        </a:solidFill>
+        <a:gradFill flip="none" rotWithShape="1">
+          <a:gsLst>
+            <a:gs pos="43000">
+              <a:srgbClr val="252525"/>
+            </a:gs>
+            <a:gs pos="70000">
+              <a:srgbClr val="0F0F0F"/>
+            </a:gs>
+            <a:gs pos="0">
+              <a:srgbClr val="434343"/>
+            </a:gs>
+            <a:gs pos="100000">
+              <a:schemeClr val="bg1">
+                <a:shade val="80000"/>
+              </a:schemeClr>
+            </a:gs>
+          </a:gsLst>
+          <a:path path="circle">
+            <a:fillToRect l="50000" t="50000" r="50000" b="50000"/>
+          </a:path>
+          <a:tileRect/>
+        </a:gradFill>
         <a:effectLst/>
       </p:bgPr>
     </p:bg>
@@ -4184,9 +4203,10 @@
         </p:nvSpPr>
         <p:spPr>
           <a:xfrm>
-            <a:off x="2225184" y="1483742"/>
+            <a:off x="2225184" y="1867618"/>
             <a:ext cx="7741631" cy="3122763"/>
           </a:xfrm>
+          <a:noFill/>
         </p:spPr>
         <p:txBody>
           <a:bodyPr>
@@ -4240,7 +4260,7 @@
 </file>
 
 <file path=ppt/slides/slide2.xml><?xml version="1.0" encoding="utf-8"?>
-<p:sld xmlns:a="http://schemas.openxmlformats.org/drawingml/2006/main" xmlns:r="http://schemas.openxmlformats.org/officeDocument/2006/relationships" xmlns:p="http://schemas.openxmlformats.org/presentationml/2006/main">
+<p:sld xmlns:a="http://schemas.openxmlformats.org/drawingml/2006/main" xmlns:r="http://schemas.openxmlformats.org/officeDocument/2006/relationships" xmlns:p="http://schemas.openxmlformats.org/presentationml/2006/main" showMasterSp="0">
   <p:cSld>
     <p:spTree>
       <p:nvGrpSpPr>
@@ -4274,7 +4294,7 @@
         </p:nvSpPr>
         <p:spPr>
           <a:xfrm>
-            <a:off x="1294362" y="1216325"/>
+            <a:off x="1294362" y="1216800"/>
             <a:ext cx="9603275" cy="568418"/>
           </a:xfrm>
         </p:spPr>
@@ -4324,24 +4344,49 @@
           </a:bodyPr>
           <a:lstStyle/>
           <a:p>
+            <a:pPr>
+              <a:buClr>
+                <a:srgbClr val="F8C533"/>
+              </a:buClr>
+            </a:pPr>
             <a:r>
               <a:rPr lang="nb-NO" sz="2800" dirty="0"/>
               <a:t>Background</a:t>
             </a:r>
           </a:p>
           <a:p>
+            <a:pPr>
+              <a:buClr>
+                <a:srgbClr val="F8C533"/>
+              </a:buClr>
+            </a:pPr>
             <a:endParaRPr lang="nb-NO" sz="2800" dirty="0"/>
           </a:p>
           <a:p>
+            <a:pPr>
+              <a:buClr>
+                <a:srgbClr val="F8C533"/>
+              </a:buClr>
+            </a:pPr>
             <a:r>
               <a:rPr lang="en-US" sz="2800" dirty="0"/>
               <a:t>Motivation</a:t>
             </a:r>
           </a:p>
           <a:p>
+            <a:pPr>
+              <a:buClr>
+                <a:srgbClr val="F8C533"/>
+              </a:buClr>
+            </a:pPr>
             <a:endParaRPr lang="en-US" sz="2800" dirty="0"/>
           </a:p>
           <a:p>
+            <a:pPr>
+              <a:buClr>
+                <a:srgbClr val="F8C533"/>
+              </a:buClr>
+            </a:pPr>
             <a:r>
               <a:rPr lang="nb-NO" sz="2800" dirty="0"/>
               <a:t>Related work</a:t>
@@ -4363,7 +4408,7 @@
 </file>
 
 <file path=ppt/slides/slide3.xml><?xml version="1.0" encoding="utf-8"?>
-<p:sld xmlns:a="http://schemas.openxmlformats.org/drawingml/2006/main" xmlns:r="http://schemas.openxmlformats.org/officeDocument/2006/relationships" xmlns:p="http://schemas.openxmlformats.org/presentationml/2006/main">
+<p:sld xmlns:a="http://schemas.openxmlformats.org/drawingml/2006/main" xmlns:r="http://schemas.openxmlformats.org/officeDocument/2006/relationships" xmlns:p="http://schemas.openxmlformats.org/presentationml/2006/main" showMasterSp="0">
   <p:cSld>
     <p:spTree>
       <p:nvGrpSpPr>
@@ -4397,7 +4442,7 @@
         </p:nvSpPr>
         <p:spPr>
           <a:xfrm>
-            <a:off x="1294362" y="2165230"/>
+            <a:off x="1294362" y="2478169"/>
             <a:ext cx="9603275" cy="1901662"/>
           </a:xfrm>
         </p:spPr>
@@ -4433,7 +4478,7 @@
 </file>
 
 <file path=ppt/slides/slide4.xml><?xml version="1.0" encoding="utf-8"?>
-<p:sld xmlns:a="http://schemas.openxmlformats.org/drawingml/2006/main" xmlns:r="http://schemas.openxmlformats.org/officeDocument/2006/relationships" xmlns:p="http://schemas.openxmlformats.org/presentationml/2006/main">
+<p:sld xmlns:a="http://schemas.openxmlformats.org/drawingml/2006/main" xmlns:r="http://schemas.openxmlformats.org/officeDocument/2006/relationships" xmlns:p="http://schemas.openxmlformats.org/presentationml/2006/main" showMasterSp="0">
   <p:cSld>
     <p:spTree>
       <p:nvGrpSpPr>
@@ -4467,7 +4512,7 @@
         </p:nvSpPr>
         <p:spPr>
           <a:xfrm>
-            <a:off x="1294362" y="1214166"/>
+            <a:off x="1294362" y="1216800"/>
             <a:ext cx="9603275" cy="568418"/>
           </a:xfrm>
         </p:spPr>
@@ -4505,7 +4550,7 @@
         </p:nvSpPr>
         <p:spPr>
           <a:xfrm>
-            <a:off x="1247309" y="2520862"/>
+            <a:off x="1370562" y="2636975"/>
             <a:ext cx="4637742" cy="908138"/>
           </a:xfrm>
           <a:prstGeom prst="rect">
@@ -4757,7 +4802,7 @@
         </p:nvSpPr>
         <p:spPr>
           <a:xfrm>
-            <a:off x="1392928" y="3530576"/>
+            <a:off x="1516181" y="3646689"/>
             <a:ext cx="2173252" cy="1301148"/>
           </a:xfrm>
           <a:prstGeom prst="rect">
@@ -4988,6 +5033,11 @@
             </a:r>
           </a:p>
           <a:p>
+            <a:pPr>
+              <a:buClr>
+                <a:srgbClr val="F8C533"/>
+              </a:buClr>
+            </a:pPr>
             <a:r>
               <a:rPr lang="en-US" sz="2400" dirty="0"/>
               <a:t>bls.gov </a:t>
@@ -5009,250 +5059,6 @@
                 </a:schemeClr>
               </a:solidFill>
             </a:endParaRPr>
-          </a:p>
-        </p:txBody>
-      </p:sp>
-      <p:sp>
-        <p:nvSpPr>
-          <p:cNvPr id="6" name="Content Placeholder 2">
-            <a:extLst>
-              <a:ext uri="{FF2B5EF4-FFF2-40B4-BE49-F238E27FC236}">
-                <a16:creationId xmlns:a16="http://schemas.microsoft.com/office/drawing/2014/main" id="{2CC4A879-BC01-4F41-B67E-E9E56FE517BF}"/>
-              </a:ext>
-            </a:extLst>
-          </p:cNvPr>
-          <p:cNvSpPr txBox="1">
-            <a:spLocks/>
-          </p:cNvSpPr>
-          <p:nvPr/>
-        </p:nvSpPr>
-        <p:spPr>
-          <a:xfrm>
-            <a:off x="5488203" y="4277259"/>
-            <a:ext cx="607796" cy="639790"/>
-          </a:xfrm>
-          <a:prstGeom prst="rect">
-            <a:avLst/>
-          </a:prstGeom>
-        </p:spPr>
-        <p:txBody>
-          <a:bodyPr vert="horz" lIns="91440" tIns="45720" rIns="91440" bIns="45720" rtlCol="0" anchor="t">
-            <a:normAutofit/>
-          </a:bodyPr>
-          <a:lstStyle>
-            <a:lvl1pPr marL="228600" indent="-228600" algn="l" defTabSz="914400" rtl="0" eaLnBrk="1" latinLnBrk="0" hangingPunct="1">
-              <a:lnSpc>
-                <a:spcPct val="120000"/>
-              </a:lnSpc>
-              <a:spcBef>
-                <a:spcPts val="1000"/>
-              </a:spcBef>
-              <a:buClr>
-                <a:schemeClr val="accent1"/>
-              </a:buClr>
-              <a:buSzPct val="100000"/>
-              <a:buFont typeface="Arial" panose="020B0604020202020204" pitchFamily="34" charset="0"/>
-              <a:buChar char="•"/>
-              <a:defRPr sz="2000" kern="1200">
-                <a:solidFill>
-                  <a:schemeClr val="tx1"/>
-                </a:solidFill>
-                <a:effectLst/>
-                <a:latin typeface="+mn-lt"/>
-                <a:ea typeface="+mn-ea"/>
-                <a:cs typeface="+mn-cs"/>
-              </a:defRPr>
-            </a:lvl1pPr>
-            <a:lvl2pPr marL="685800" indent="-228600" algn="l" defTabSz="914400" rtl="0" eaLnBrk="1" latinLnBrk="0" hangingPunct="1">
-              <a:lnSpc>
-                <a:spcPct val="120000"/>
-              </a:lnSpc>
-              <a:spcBef>
-                <a:spcPts val="500"/>
-              </a:spcBef>
-              <a:buClr>
-                <a:schemeClr val="accent1"/>
-              </a:buClr>
-              <a:buSzPct val="100000"/>
-              <a:buFont typeface="Arial" panose="020B0604020202020204" pitchFamily="34" charset="0"/>
-              <a:buChar char="•"/>
-              <a:defRPr sz="1800" kern="1200" cap="none" baseline="0">
-                <a:solidFill>
-                  <a:schemeClr val="tx1"/>
-                </a:solidFill>
-                <a:effectLst/>
-                <a:latin typeface="+mn-lt"/>
-                <a:ea typeface="+mn-ea"/>
-                <a:cs typeface="+mn-cs"/>
-              </a:defRPr>
-            </a:lvl2pPr>
-            <a:lvl3pPr marL="1143000" indent="-228600" algn="l" defTabSz="914400" rtl="0" eaLnBrk="1" latinLnBrk="0" hangingPunct="1">
-              <a:lnSpc>
-                <a:spcPct val="120000"/>
-              </a:lnSpc>
-              <a:spcBef>
-                <a:spcPts val="500"/>
-              </a:spcBef>
-              <a:buClr>
-                <a:schemeClr val="accent1"/>
-              </a:buClr>
-              <a:buSzPct val="100000"/>
-              <a:buFont typeface="Arial" panose="020B0604020202020204" pitchFamily="34" charset="0"/>
-              <a:buChar char="•"/>
-              <a:defRPr sz="1600" kern="1200">
-                <a:solidFill>
-                  <a:schemeClr val="tx1"/>
-                </a:solidFill>
-                <a:effectLst/>
-                <a:latin typeface="+mn-lt"/>
-                <a:ea typeface="+mn-ea"/>
-                <a:cs typeface="+mn-cs"/>
-              </a:defRPr>
-            </a:lvl3pPr>
-            <a:lvl4pPr marL="1600200" indent="-228600" algn="l" defTabSz="914400" rtl="0" eaLnBrk="1" latinLnBrk="0" hangingPunct="1">
-              <a:lnSpc>
-                <a:spcPct val="120000"/>
-              </a:lnSpc>
-              <a:spcBef>
-                <a:spcPts val="500"/>
-              </a:spcBef>
-              <a:buClr>
-                <a:schemeClr val="accent1"/>
-              </a:buClr>
-              <a:buSzPct val="100000"/>
-              <a:buFont typeface="Arial" panose="020B0604020202020204" pitchFamily="34" charset="0"/>
-              <a:buChar char="•"/>
-              <a:defRPr sz="1400" kern="1200" cap="none" baseline="0">
-                <a:solidFill>
-                  <a:schemeClr val="tx1"/>
-                </a:solidFill>
-                <a:effectLst/>
-                <a:latin typeface="+mn-lt"/>
-                <a:ea typeface="+mn-ea"/>
-                <a:cs typeface="+mn-cs"/>
-              </a:defRPr>
-            </a:lvl4pPr>
-            <a:lvl5pPr marL="2057400" indent="-228600" algn="l" defTabSz="914400" rtl="0" eaLnBrk="1" latinLnBrk="0" hangingPunct="1">
-              <a:lnSpc>
-                <a:spcPct val="120000"/>
-              </a:lnSpc>
-              <a:spcBef>
-                <a:spcPts val="500"/>
-              </a:spcBef>
-              <a:buClr>
-                <a:schemeClr val="accent1"/>
-              </a:buClr>
-              <a:buSzPct val="100000"/>
-              <a:buFont typeface="Arial" panose="020B0604020202020204" pitchFamily="34" charset="0"/>
-              <a:buChar char="•"/>
-              <a:defRPr sz="1200" kern="1200">
-                <a:solidFill>
-                  <a:schemeClr val="tx1"/>
-                </a:solidFill>
-                <a:effectLst/>
-                <a:latin typeface="+mn-lt"/>
-                <a:ea typeface="+mn-ea"/>
-                <a:cs typeface="+mn-cs"/>
-              </a:defRPr>
-            </a:lvl5pPr>
-            <a:lvl6pPr marL="2514600" indent="-228600" algn="l" defTabSz="914400" rtl="0" eaLnBrk="1" latinLnBrk="0" hangingPunct="1">
-              <a:lnSpc>
-                <a:spcPct val="120000"/>
-              </a:lnSpc>
-              <a:spcBef>
-                <a:spcPts val="500"/>
-              </a:spcBef>
-              <a:buClr>
-                <a:schemeClr val="accent1"/>
-              </a:buClr>
-              <a:buSzPct val="100000"/>
-              <a:buFont typeface="Arial" panose="020B0604020202020204" pitchFamily="34" charset="0"/>
-              <a:buChar char="•"/>
-              <a:defRPr sz="1200" kern="1200">
-                <a:solidFill>
-                  <a:schemeClr val="tx1"/>
-                </a:solidFill>
-                <a:effectLst/>
-                <a:latin typeface="+mn-lt"/>
-                <a:ea typeface="+mn-ea"/>
-                <a:cs typeface="+mn-cs"/>
-              </a:defRPr>
-            </a:lvl6pPr>
-            <a:lvl7pPr marL="2971800" indent="-228600" algn="l" defTabSz="914400" rtl="0" eaLnBrk="1" latinLnBrk="0" hangingPunct="1">
-              <a:lnSpc>
-                <a:spcPct val="120000"/>
-              </a:lnSpc>
-              <a:spcBef>
-                <a:spcPts val="500"/>
-              </a:spcBef>
-              <a:buClr>
-                <a:schemeClr val="accent1"/>
-              </a:buClr>
-              <a:buSzPct val="100000"/>
-              <a:buFont typeface="Arial" panose="020B0604020202020204" pitchFamily="34" charset="0"/>
-              <a:buChar char="•"/>
-              <a:defRPr sz="1200" kern="1200">
-                <a:solidFill>
-                  <a:schemeClr val="tx1"/>
-                </a:solidFill>
-                <a:effectLst/>
-                <a:latin typeface="+mn-lt"/>
-                <a:ea typeface="+mn-ea"/>
-                <a:cs typeface="+mn-cs"/>
-              </a:defRPr>
-            </a:lvl7pPr>
-            <a:lvl8pPr marL="3429000" indent="-228600" algn="l" defTabSz="914400" rtl="0" eaLnBrk="1" latinLnBrk="0" hangingPunct="1">
-              <a:lnSpc>
-                <a:spcPct val="120000"/>
-              </a:lnSpc>
-              <a:spcBef>
-                <a:spcPts val="500"/>
-              </a:spcBef>
-              <a:buClr>
-                <a:schemeClr val="accent1"/>
-              </a:buClr>
-              <a:buSzPct val="100000"/>
-              <a:buFont typeface="Arial" panose="020B0604020202020204" pitchFamily="34" charset="0"/>
-              <a:buChar char="•"/>
-              <a:defRPr sz="1200" kern="1200" baseline="0">
-                <a:solidFill>
-                  <a:schemeClr val="tx1"/>
-                </a:solidFill>
-                <a:effectLst/>
-                <a:latin typeface="+mn-lt"/>
-                <a:ea typeface="+mn-ea"/>
-                <a:cs typeface="+mn-cs"/>
-              </a:defRPr>
-            </a:lvl8pPr>
-            <a:lvl9pPr marL="3886200" indent="-228600" algn="l" defTabSz="914400" rtl="0" eaLnBrk="1" latinLnBrk="0" hangingPunct="1">
-              <a:lnSpc>
-                <a:spcPct val="120000"/>
-              </a:lnSpc>
-              <a:spcBef>
-                <a:spcPts val="500"/>
-              </a:spcBef>
-              <a:buClr>
-                <a:schemeClr val="accent1"/>
-              </a:buClr>
-              <a:buSzPct val="100000"/>
-              <a:buFont typeface="Arial" panose="020B0604020202020204" pitchFamily="34" charset="0"/>
-              <a:buChar char="•"/>
-              <a:defRPr sz="1200" kern="1200" baseline="0">
-                <a:solidFill>
-                  <a:schemeClr val="tx1"/>
-                </a:solidFill>
-                <a:effectLst/>
-                <a:latin typeface="+mn-lt"/>
-                <a:ea typeface="+mn-ea"/>
-                <a:cs typeface="+mn-cs"/>
-              </a:defRPr>
-            </a:lvl9pPr>
-          </a:lstStyle>
-          <a:p>
-            <a:r>
-              <a:rPr lang="en-US" sz="2800" dirty="0"/>
-              <a:t> </a:t>
-            </a:r>
           </a:p>
         </p:txBody>
       </p:sp>
@@ -5272,7 +5078,7 @@
         </p:nvSpPr>
         <p:spPr>
           <a:xfrm>
-            <a:off x="7545725" y="2729581"/>
+            <a:off x="7668978" y="2845694"/>
             <a:ext cx="2458112" cy="699419"/>
           </a:xfrm>
           <a:prstGeom prst="rect">
@@ -5524,8 +5330,8 @@
         </p:nvSpPr>
         <p:spPr>
           <a:xfrm>
-            <a:off x="6452570" y="3530576"/>
-            <a:ext cx="4644422" cy="1301148"/>
+            <a:off x="7302500" y="3646689"/>
+            <a:ext cx="3191068" cy="1301148"/>
           </a:xfrm>
           <a:prstGeom prst="rect">
             <a:avLst/>
@@ -5805,7 +5611,7 @@
         </p:nvSpPr>
         <p:spPr>
           <a:xfrm>
-            <a:off x="3566180" y="3530576"/>
+            <a:off x="3689433" y="3646689"/>
             <a:ext cx="2173252" cy="1301148"/>
           </a:xfrm>
           <a:prstGeom prst="rect">
@@ -6057,7 +5863,7 @@
             <a:r>
               <a:rPr lang="en-US" sz="1800" b="0" i="0" dirty="0">
                 <a:solidFill>
-                  <a:srgbClr val="242729"/>
+                  <a:srgbClr val="986630"/>
                 </a:solidFill>
                 <a:effectLst/>
                 <a:latin typeface="Consolas" panose="020B0609020204030204" pitchFamily="49" charset="0"/>
@@ -6066,9 +5872,7 @@
             </a:r>
             <a:endParaRPr lang="en-US" sz="1800" dirty="0">
               <a:solidFill>
-                <a:schemeClr val="tx1">
-                  <a:lumMod val="50000"/>
-                </a:schemeClr>
+                <a:srgbClr val="986630"/>
               </a:solidFill>
             </a:endParaRPr>
           </a:p>
@@ -6090,13 +5894,13 @@
         </p:nvCxnSpPr>
         <p:spPr>
           <a:xfrm>
-            <a:off x="3583433" y="3429000"/>
+            <a:off x="3706686" y="3545113"/>
             <a:ext cx="0" cy="1488049"/>
           </a:xfrm>
           <a:prstGeom prst="line">
             <a:avLst/>
           </a:prstGeom>
-          <a:ln w="28575">
+          <a:ln w="38100">
             <a:solidFill>
               <a:srgbClr val="F8C533"/>
             </a:solidFill>
@@ -6117,6 +5921,259 @@
           </a:fontRef>
         </p:style>
       </p:cxnSp>
+      <p:sp>
+        <p:nvSpPr>
+          <p:cNvPr id="11" name="Content Placeholder 2">
+            <a:extLst>
+              <a:ext uri="{FF2B5EF4-FFF2-40B4-BE49-F238E27FC236}">
+                <a16:creationId xmlns:a16="http://schemas.microsoft.com/office/drawing/2014/main" id="{C64762CA-4E26-4AD9-99E7-03A2FA7B37FC}"/>
+              </a:ext>
+            </a:extLst>
+          </p:cNvPr>
+          <p:cNvSpPr txBox="1">
+            <a:spLocks/>
+          </p:cNvSpPr>
+          <p:nvPr/>
+        </p:nvSpPr>
+        <p:spPr>
+          <a:xfrm>
+            <a:off x="5642715" y="4396870"/>
+            <a:ext cx="607796" cy="639790"/>
+          </a:xfrm>
+          <a:prstGeom prst="rect">
+            <a:avLst/>
+          </a:prstGeom>
+        </p:spPr>
+        <p:txBody>
+          <a:bodyPr vert="horz" lIns="91440" tIns="45720" rIns="91440" bIns="45720" rtlCol="0" anchor="t">
+            <a:normAutofit/>
+          </a:bodyPr>
+          <a:lstStyle>
+            <a:lvl1pPr marL="228600" indent="-228600" algn="l" defTabSz="914400" rtl="0" eaLnBrk="1" latinLnBrk="0" hangingPunct="1">
+              <a:lnSpc>
+                <a:spcPct val="120000"/>
+              </a:lnSpc>
+              <a:spcBef>
+                <a:spcPts val="1000"/>
+              </a:spcBef>
+              <a:buClr>
+                <a:schemeClr val="accent1"/>
+              </a:buClr>
+              <a:buSzPct val="100000"/>
+              <a:buFont typeface="Arial" panose="020B0604020202020204" pitchFamily="34" charset="0"/>
+              <a:buChar char="•"/>
+              <a:defRPr sz="2000" kern="1200">
+                <a:solidFill>
+                  <a:schemeClr val="tx1"/>
+                </a:solidFill>
+                <a:effectLst/>
+                <a:latin typeface="+mn-lt"/>
+                <a:ea typeface="+mn-ea"/>
+                <a:cs typeface="+mn-cs"/>
+              </a:defRPr>
+            </a:lvl1pPr>
+            <a:lvl2pPr marL="685800" indent="-228600" algn="l" defTabSz="914400" rtl="0" eaLnBrk="1" latinLnBrk="0" hangingPunct="1">
+              <a:lnSpc>
+                <a:spcPct val="120000"/>
+              </a:lnSpc>
+              <a:spcBef>
+                <a:spcPts val="500"/>
+              </a:spcBef>
+              <a:buClr>
+                <a:schemeClr val="accent1"/>
+              </a:buClr>
+              <a:buSzPct val="100000"/>
+              <a:buFont typeface="Arial" panose="020B0604020202020204" pitchFamily="34" charset="0"/>
+              <a:buChar char="•"/>
+              <a:defRPr sz="1800" kern="1200" cap="none" baseline="0">
+                <a:solidFill>
+                  <a:schemeClr val="tx1"/>
+                </a:solidFill>
+                <a:effectLst/>
+                <a:latin typeface="+mn-lt"/>
+                <a:ea typeface="+mn-ea"/>
+                <a:cs typeface="+mn-cs"/>
+              </a:defRPr>
+            </a:lvl2pPr>
+            <a:lvl3pPr marL="1143000" indent="-228600" algn="l" defTabSz="914400" rtl="0" eaLnBrk="1" latinLnBrk="0" hangingPunct="1">
+              <a:lnSpc>
+                <a:spcPct val="120000"/>
+              </a:lnSpc>
+              <a:spcBef>
+                <a:spcPts val="500"/>
+              </a:spcBef>
+              <a:buClr>
+                <a:schemeClr val="accent1"/>
+              </a:buClr>
+              <a:buSzPct val="100000"/>
+              <a:buFont typeface="Arial" panose="020B0604020202020204" pitchFamily="34" charset="0"/>
+              <a:buChar char="•"/>
+              <a:defRPr sz="1600" kern="1200">
+                <a:solidFill>
+                  <a:schemeClr val="tx1"/>
+                </a:solidFill>
+                <a:effectLst/>
+                <a:latin typeface="+mn-lt"/>
+                <a:ea typeface="+mn-ea"/>
+                <a:cs typeface="+mn-cs"/>
+              </a:defRPr>
+            </a:lvl3pPr>
+            <a:lvl4pPr marL="1600200" indent="-228600" algn="l" defTabSz="914400" rtl="0" eaLnBrk="1" latinLnBrk="0" hangingPunct="1">
+              <a:lnSpc>
+                <a:spcPct val="120000"/>
+              </a:lnSpc>
+              <a:spcBef>
+                <a:spcPts val="500"/>
+              </a:spcBef>
+              <a:buClr>
+                <a:schemeClr val="accent1"/>
+              </a:buClr>
+              <a:buSzPct val="100000"/>
+              <a:buFont typeface="Arial" panose="020B0604020202020204" pitchFamily="34" charset="0"/>
+              <a:buChar char="•"/>
+              <a:defRPr sz="1400" kern="1200" cap="none" baseline="0">
+                <a:solidFill>
+                  <a:schemeClr val="tx1"/>
+                </a:solidFill>
+                <a:effectLst/>
+                <a:latin typeface="+mn-lt"/>
+                <a:ea typeface="+mn-ea"/>
+                <a:cs typeface="+mn-cs"/>
+              </a:defRPr>
+            </a:lvl4pPr>
+            <a:lvl5pPr marL="2057400" indent="-228600" algn="l" defTabSz="914400" rtl="0" eaLnBrk="1" latinLnBrk="0" hangingPunct="1">
+              <a:lnSpc>
+                <a:spcPct val="120000"/>
+              </a:lnSpc>
+              <a:spcBef>
+                <a:spcPts val="500"/>
+              </a:spcBef>
+              <a:buClr>
+                <a:schemeClr val="accent1"/>
+              </a:buClr>
+              <a:buSzPct val="100000"/>
+              <a:buFont typeface="Arial" panose="020B0604020202020204" pitchFamily="34" charset="0"/>
+              <a:buChar char="•"/>
+              <a:defRPr sz="1200" kern="1200">
+                <a:solidFill>
+                  <a:schemeClr val="tx1"/>
+                </a:solidFill>
+                <a:effectLst/>
+                <a:latin typeface="+mn-lt"/>
+                <a:ea typeface="+mn-ea"/>
+                <a:cs typeface="+mn-cs"/>
+              </a:defRPr>
+            </a:lvl5pPr>
+            <a:lvl6pPr marL="2514600" indent="-228600" algn="l" defTabSz="914400" rtl="0" eaLnBrk="1" latinLnBrk="0" hangingPunct="1">
+              <a:lnSpc>
+                <a:spcPct val="120000"/>
+              </a:lnSpc>
+              <a:spcBef>
+                <a:spcPts val="500"/>
+              </a:spcBef>
+              <a:buClr>
+                <a:schemeClr val="accent1"/>
+              </a:buClr>
+              <a:buSzPct val="100000"/>
+              <a:buFont typeface="Arial" panose="020B0604020202020204" pitchFamily="34" charset="0"/>
+              <a:buChar char="•"/>
+              <a:defRPr sz="1200" kern="1200">
+                <a:solidFill>
+                  <a:schemeClr val="tx1"/>
+                </a:solidFill>
+                <a:effectLst/>
+                <a:latin typeface="+mn-lt"/>
+                <a:ea typeface="+mn-ea"/>
+                <a:cs typeface="+mn-cs"/>
+              </a:defRPr>
+            </a:lvl6pPr>
+            <a:lvl7pPr marL="2971800" indent="-228600" algn="l" defTabSz="914400" rtl="0" eaLnBrk="1" latinLnBrk="0" hangingPunct="1">
+              <a:lnSpc>
+                <a:spcPct val="120000"/>
+              </a:lnSpc>
+              <a:spcBef>
+                <a:spcPts val="500"/>
+              </a:spcBef>
+              <a:buClr>
+                <a:schemeClr val="accent1"/>
+              </a:buClr>
+              <a:buSzPct val="100000"/>
+              <a:buFont typeface="Arial" panose="020B0604020202020204" pitchFamily="34" charset="0"/>
+              <a:buChar char="•"/>
+              <a:defRPr sz="1200" kern="1200">
+                <a:solidFill>
+                  <a:schemeClr val="tx1"/>
+                </a:solidFill>
+                <a:effectLst/>
+                <a:latin typeface="+mn-lt"/>
+                <a:ea typeface="+mn-ea"/>
+                <a:cs typeface="+mn-cs"/>
+              </a:defRPr>
+            </a:lvl7pPr>
+            <a:lvl8pPr marL="3429000" indent="-228600" algn="l" defTabSz="914400" rtl="0" eaLnBrk="1" latinLnBrk="0" hangingPunct="1">
+              <a:lnSpc>
+                <a:spcPct val="120000"/>
+              </a:lnSpc>
+              <a:spcBef>
+                <a:spcPts val="500"/>
+              </a:spcBef>
+              <a:buClr>
+                <a:schemeClr val="accent1"/>
+              </a:buClr>
+              <a:buSzPct val="100000"/>
+              <a:buFont typeface="Arial" panose="020B0604020202020204" pitchFamily="34" charset="0"/>
+              <a:buChar char="•"/>
+              <a:defRPr sz="1200" kern="1200" baseline="0">
+                <a:solidFill>
+                  <a:schemeClr val="tx1"/>
+                </a:solidFill>
+                <a:effectLst/>
+                <a:latin typeface="+mn-lt"/>
+                <a:ea typeface="+mn-ea"/>
+                <a:cs typeface="+mn-cs"/>
+              </a:defRPr>
+            </a:lvl8pPr>
+            <a:lvl9pPr marL="3886200" indent="-228600" algn="l" defTabSz="914400" rtl="0" eaLnBrk="1" latinLnBrk="0" hangingPunct="1">
+              <a:lnSpc>
+                <a:spcPct val="120000"/>
+              </a:lnSpc>
+              <a:spcBef>
+                <a:spcPts val="500"/>
+              </a:spcBef>
+              <a:buClr>
+                <a:schemeClr val="accent1"/>
+              </a:buClr>
+              <a:buSzPct val="100000"/>
+              <a:buFont typeface="Arial" panose="020B0604020202020204" pitchFamily="34" charset="0"/>
+              <a:buChar char="•"/>
+              <a:defRPr sz="1200" kern="1200" baseline="0">
+                <a:solidFill>
+                  <a:schemeClr val="tx1"/>
+                </a:solidFill>
+                <a:effectLst/>
+                <a:latin typeface="+mn-lt"/>
+                <a:ea typeface="+mn-ea"/>
+                <a:cs typeface="+mn-cs"/>
+              </a:defRPr>
+            </a:lvl9pPr>
+          </a:lstStyle>
+          <a:p>
+            <a:pPr>
+              <a:buClr>
+                <a:srgbClr val="F8C533"/>
+              </a:buClr>
+            </a:pPr>
+            <a:r>
+              <a:rPr lang="en-US" sz="2800" dirty="0">
+                <a:solidFill>
+                  <a:srgbClr val="986630"/>
+                </a:solidFill>
+              </a:rPr>
+              <a:t> </a:t>
+            </a:r>
+          </a:p>
+        </p:txBody>
+      </p:sp>
     </p:spTree>
     <p:extLst>
       <p:ext uri="{BB962C8B-B14F-4D97-AF65-F5344CB8AC3E}">
@@ -6131,7 +6188,7 @@
 </file>
 
 <file path=ppt/slides/slide5.xml><?xml version="1.0" encoding="utf-8"?>
-<p:sld xmlns:a="http://schemas.openxmlformats.org/drawingml/2006/main" xmlns:r="http://schemas.openxmlformats.org/officeDocument/2006/relationships" xmlns:p="http://schemas.openxmlformats.org/presentationml/2006/main">
+<p:sld xmlns:a="http://schemas.openxmlformats.org/drawingml/2006/main" xmlns:r="http://schemas.openxmlformats.org/officeDocument/2006/relationships" xmlns:p="http://schemas.openxmlformats.org/presentationml/2006/main" showMasterSp="0">
   <p:cSld>
     <p:spTree>
       <p:nvGrpSpPr>
@@ -6165,7 +6222,7 @@
         </p:nvSpPr>
         <p:spPr>
           <a:xfrm>
-            <a:off x="1294362" y="2174466"/>
+            <a:off x="1294362" y="2478169"/>
             <a:ext cx="9603275" cy="1901662"/>
           </a:xfrm>
         </p:spPr>
@@ -6201,7 +6258,7 @@
 </file>
 
 <file path=ppt/slides/slide6.xml><?xml version="1.0" encoding="utf-8"?>
-<p:sld xmlns:a="http://schemas.openxmlformats.org/drawingml/2006/main" xmlns:r="http://schemas.openxmlformats.org/officeDocument/2006/relationships" xmlns:p="http://schemas.openxmlformats.org/presentationml/2006/main">
+<p:sld xmlns:a="http://schemas.openxmlformats.org/drawingml/2006/main" xmlns:r="http://schemas.openxmlformats.org/officeDocument/2006/relationships" xmlns:p="http://schemas.openxmlformats.org/presentationml/2006/main" showMasterSp="0">
   <p:cSld>
     <p:spTree>
       <p:nvGrpSpPr>
@@ -6235,7 +6292,7 @@
         </p:nvSpPr>
         <p:spPr>
           <a:xfrm>
-            <a:off x="1294362" y="1216325"/>
+            <a:off x="1294361" y="1216800"/>
             <a:ext cx="9603275" cy="568418"/>
           </a:xfrm>
         </p:spPr>
@@ -6275,49 +6332,50 @@
         </p:nvSpPr>
         <p:spPr>
           <a:xfrm>
-            <a:off x="2362702" y="2398144"/>
-            <a:ext cx="3733298" cy="3243531"/>
+            <a:off x="3596305" y="2742096"/>
+            <a:ext cx="2769189" cy="2510286"/>
           </a:xfrm>
         </p:spPr>
         <p:txBody>
           <a:bodyPr>
-            <a:normAutofit lnSpcReduction="10000"/>
+            <a:normAutofit/>
           </a:bodyPr>
           <a:lstStyle/>
           <a:p>
+            <a:pPr marL="0" indent="0">
+              <a:buNone/>
+            </a:pPr>
             <a:r>
               <a:rPr lang="en-US" sz="2800" dirty="0"/>
-              <a:t>1. Wave</a:t>
-            </a:r>
-          </a:p>
-          <a:p>
-            <a:pPr lvl="1"/>
-            <a:r>
-              <a:rPr lang="en-US" sz="2600" dirty="0"/>
-              <a:t> Lockdown</a:t>
-            </a:r>
-          </a:p>
-          <a:p>
-            <a:pPr lvl="1"/>
-            <a:endParaRPr lang="en-US" sz="2600" dirty="0"/>
-          </a:p>
-          <a:p>
+              <a:t>Lockdown</a:t>
+            </a:r>
+            <a:endParaRPr lang="en-US" sz="2800" dirty="0">
+              <a:solidFill>
+                <a:srgbClr val="F8C533"/>
+              </a:solidFill>
+            </a:endParaRPr>
+          </a:p>
+          <a:p>
+            <a:pPr marL="0" indent="0">
+              <a:buNone/>
+            </a:pPr>
+            <a:endParaRPr lang="en-US" sz="2800" dirty="0"/>
+          </a:p>
+          <a:p>
+            <a:pPr marL="0" indent="0">
+              <a:buNone/>
+            </a:pPr>
             <a:r>
               <a:rPr lang="en-US" sz="2800" dirty="0"/>
-              <a:t>2. Wave</a:t>
-            </a:r>
-          </a:p>
-          <a:p>
-            <a:pPr lvl="1"/>
-            <a:r>
-              <a:rPr lang="en-US" sz="2600" dirty="0"/>
-              <a:t> No lockdown</a:t>
-            </a:r>
-          </a:p>
-          <a:p>
-            <a:pPr lvl="1"/>
-            <a:r>
-              <a:rPr lang="en-US" sz="2600" dirty="0"/>
+              <a:t>No lockdown</a:t>
+            </a:r>
+          </a:p>
+          <a:p>
+            <a:pPr marL="0" indent="0">
+              <a:buNone/>
+            </a:pPr>
+            <a:r>
+              <a:rPr lang="en-US" sz="2800" dirty="0"/>
               <a:t>People adapted</a:t>
             </a:r>
           </a:p>
@@ -6339,8 +6397,8 @@
         </p:nvSpPr>
         <p:spPr>
           <a:xfrm>
-            <a:off x="6811818" y="3153000"/>
-            <a:ext cx="3017480" cy="866909"/>
+            <a:off x="7586974" y="3429635"/>
+            <a:ext cx="2853064" cy="866909"/>
           </a:xfrm>
           <a:prstGeom prst="rect">
             <a:avLst/>
@@ -6578,6 +6636,574 @@
             </a:endParaRPr>
           </a:p>
         </p:txBody>
+      </p:sp>
+      <p:sp>
+        <p:nvSpPr>
+          <p:cNvPr id="5" name="Content Placeholder 2">
+            <a:extLst>
+              <a:ext uri="{FF2B5EF4-FFF2-40B4-BE49-F238E27FC236}">
+                <a16:creationId xmlns:a16="http://schemas.microsoft.com/office/drawing/2014/main" id="{BCBDBF35-CAC8-4BFE-A927-D78029D7D8D1}"/>
+              </a:ext>
+            </a:extLst>
+          </p:cNvPr>
+          <p:cNvSpPr txBox="1">
+            <a:spLocks/>
+          </p:cNvSpPr>
+          <p:nvPr/>
+        </p:nvSpPr>
+        <p:spPr>
+          <a:xfrm>
+            <a:off x="1723285" y="2742096"/>
+            <a:ext cx="1460648" cy="700874"/>
+          </a:xfrm>
+          <a:prstGeom prst="rect">
+            <a:avLst/>
+          </a:prstGeom>
+        </p:spPr>
+        <p:txBody>
+          <a:bodyPr vert="horz" lIns="91440" tIns="45720" rIns="91440" bIns="45720" rtlCol="0" anchor="t">
+            <a:normAutofit/>
+          </a:bodyPr>
+          <a:lstStyle>
+            <a:lvl1pPr marL="228600" indent="-228600" algn="l" defTabSz="914400" rtl="0" eaLnBrk="1" latinLnBrk="0" hangingPunct="1">
+              <a:lnSpc>
+                <a:spcPct val="120000"/>
+              </a:lnSpc>
+              <a:spcBef>
+                <a:spcPts val="1000"/>
+              </a:spcBef>
+              <a:buClr>
+                <a:schemeClr val="accent1"/>
+              </a:buClr>
+              <a:buSzPct val="100000"/>
+              <a:buFont typeface="Arial" panose="020B0604020202020204" pitchFamily="34" charset="0"/>
+              <a:buChar char="•"/>
+              <a:defRPr sz="2000" kern="1200">
+                <a:solidFill>
+                  <a:schemeClr val="tx1"/>
+                </a:solidFill>
+                <a:effectLst/>
+                <a:latin typeface="+mn-lt"/>
+                <a:ea typeface="+mn-ea"/>
+                <a:cs typeface="+mn-cs"/>
+              </a:defRPr>
+            </a:lvl1pPr>
+            <a:lvl2pPr marL="685800" indent="-228600" algn="l" defTabSz="914400" rtl="0" eaLnBrk="1" latinLnBrk="0" hangingPunct="1">
+              <a:lnSpc>
+                <a:spcPct val="120000"/>
+              </a:lnSpc>
+              <a:spcBef>
+                <a:spcPts val="500"/>
+              </a:spcBef>
+              <a:buClr>
+                <a:schemeClr val="accent1"/>
+              </a:buClr>
+              <a:buSzPct val="100000"/>
+              <a:buFont typeface="Arial" panose="020B0604020202020204" pitchFamily="34" charset="0"/>
+              <a:buChar char="•"/>
+              <a:defRPr sz="1800" kern="1200" cap="none" baseline="0">
+                <a:solidFill>
+                  <a:schemeClr val="tx1"/>
+                </a:solidFill>
+                <a:effectLst/>
+                <a:latin typeface="+mn-lt"/>
+                <a:ea typeface="+mn-ea"/>
+                <a:cs typeface="+mn-cs"/>
+              </a:defRPr>
+            </a:lvl2pPr>
+            <a:lvl3pPr marL="1143000" indent="-228600" algn="l" defTabSz="914400" rtl="0" eaLnBrk="1" latinLnBrk="0" hangingPunct="1">
+              <a:lnSpc>
+                <a:spcPct val="120000"/>
+              </a:lnSpc>
+              <a:spcBef>
+                <a:spcPts val="500"/>
+              </a:spcBef>
+              <a:buClr>
+                <a:schemeClr val="accent1"/>
+              </a:buClr>
+              <a:buSzPct val="100000"/>
+              <a:buFont typeface="Arial" panose="020B0604020202020204" pitchFamily="34" charset="0"/>
+              <a:buChar char="•"/>
+              <a:defRPr sz="1600" kern="1200">
+                <a:solidFill>
+                  <a:schemeClr val="tx1"/>
+                </a:solidFill>
+                <a:effectLst/>
+                <a:latin typeface="+mn-lt"/>
+                <a:ea typeface="+mn-ea"/>
+                <a:cs typeface="+mn-cs"/>
+              </a:defRPr>
+            </a:lvl3pPr>
+            <a:lvl4pPr marL="1600200" indent="-228600" algn="l" defTabSz="914400" rtl="0" eaLnBrk="1" latinLnBrk="0" hangingPunct="1">
+              <a:lnSpc>
+                <a:spcPct val="120000"/>
+              </a:lnSpc>
+              <a:spcBef>
+                <a:spcPts val="500"/>
+              </a:spcBef>
+              <a:buClr>
+                <a:schemeClr val="accent1"/>
+              </a:buClr>
+              <a:buSzPct val="100000"/>
+              <a:buFont typeface="Arial" panose="020B0604020202020204" pitchFamily="34" charset="0"/>
+              <a:buChar char="•"/>
+              <a:defRPr sz="1400" kern="1200" cap="none" baseline="0">
+                <a:solidFill>
+                  <a:schemeClr val="tx1"/>
+                </a:solidFill>
+                <a:effectLst/>
+                <a:latin typeface="+mn-lt"/>
+                <a:ea typeface="+mn-ea"/>
+                <a:cs typeface="+mn-cs"/>
+              </a:defRPr>
+            </a:lvl4pPr>
+            <a:lvl5pPr marL="2057400" indent="-228600" algn="l" defTabSz="914400" rtl="0" eaLnBrk="1" latinLnBrk="0" hangingPunct="1">
+              <a:lnSpc>
+                <a:spcPct val="120000"/>
+              </a:lnSpc>
+              <a:spcBef>
+                <a:spcPts val="500"/>
+              </a:spcBef>
+              <a:buClr>
+                <a:schemeClr val="accent1"/>
+              </a:buClr>
+              <a:buSzPct val="100000"/>
+              <a:buFont typeface="Arial" panose="020B0604020202020204" pitchFamily="34" charset="0"/>
+              <a:buChar char="•"/>
+              <a:defRPr sz="1200" kern="1200">
+                <a:solidFill>
+                  <a:schemeClr val="tx1"/>
+                </a:solidFill>
+                <a:effectLst/>
+                <a:latin typeface="+mn-lt"/>
+                <a:ea typeface="+mn-ea"/>
+                <a:cs typeface="+mn-cs"/>
+              </a:defRPr>
+            </a:lvl5pPr>
+            <a:lvl6pPr marL="2514600" indent="-228600" algn="l" defTabSz="914400" rtl="0" eaLnBrk="1" latinLnBrk="0" hangingPunct="1">
+              <a:lnSpc>
+                <a:spcPct val="120000"/>
+              </a:lnSpc>
+              <a:spcBef>
+                <a:spcPts val="500"/>
+              </a:spcBef>
+              <a:buClr>
+                <a:schemeClr val="accent1"/>
+              </a:buClr>
+              <a:buSzPct val="100000"/>
+              <a:buFont typeface="Arial" panose="020B0604020202020204" pitchFamily="34" charset="0"/>
+              <a:buChar char="•"/>
+              <a:defRPr sz="1200" kern="1200">
+                <a:solidFill>
+                  <a:schemeClr val="tx1"/>
+                </a:solidFill>
+                <a:effectLst/>
+                <a:latin typeface="+mn-lt"/>
+                <a:ea typeface="+mn-ea"/>
+                <a:cs typeface="+mn-cs"/>
+              </a:defRPr>
+            </a:lvl6pPr>
+            <a:lvl7pPr marL="2971800" indent="-228600" algn="l" defTabSz="914400" rtl="0" eaLnBrk="1" latinLnBrk="0" hangingPunct="1">
+              <a:lnSpc>
+                <a:spcPct val="120000"/>
+              </a:lnSpc>
+              <a:spcBef>
+                <a:spcPts val="500"/>
+              </a:spcBef>
+              <a:buClr>
+                <a:schemeClr val="accent1"/>
+              </a:buClr>
+              <a:buSzPct val="100000"/>
+              <a:buFont typeface="Arial" panose="020B0604020202020204" pitchFamily="34" charset="0"/>
+              <a:buChar char="•"/>
+              <a:defRPr sz="1200" kern="1200">
+                <a:solidFill>
+                  <a:schemeClr val="tx1"/>
+                </a:solidFill>
+                <a:effectLst/>
+                <a:latin typeface="+mn-lt"/>
+                <a:ea typeface="+mn-ea"/>
+                <a:cs typeface="+mn-cs"/>
+              </a:defRPr>
+            </a:lvl7pPr>
+            <a:lvl8pPr marL="3429000" indent="-228600" algn="l" defTabSz="914400" rtl="0" eaLnBrk="1" latinLnBrk="0" hangingPunct="1">
+              <a:lnSpc>
+                <a:spcPct val="120000"/>
+              </a:lnSpc>
+              <a:spcBef>
+                <a:spcPts val="500"/>
+              </a:spcBef>
+              <a:buClr>
+                <a:schemeClr val="accent1"/>
+              </a:buClr>
+              <a:buSzPct val="100000"/>
+              <a:buFont typeface="Arial" panose="020B0604020202020204" pitchFamily="34" charset="0"/>
+              <a:buChar char="•"/>
+              <a:defRPr sz="1200" kern="1200" baseline="0">
+                <a:solidFill>
+                  <a:schemeClr val="tx1"/>
+                </a:solidFill>
+                <a:effectLst/>
+                <a:latin typeface="+mn-lt"/>
+                <a:ea typeface="+mn-ea"/>
+                <a:cs typeface="+mn-cs"/>
+              </a:defRPr>
+            </a:lvl8pPr>
+            <a:lvl9pPr marL="3886200" indent="-228600" algn="l" defTabSz="914400" rtl="0" eaLnBrk="1" latinLnBrk="0" hangingPunct="1">
+              <a:lnSpc>
+                <a:spcPct val="120000"/>
+              </a:lnSpc>
+              <a:spcBef>
+                <a:spcPts val="500"/>
+              </a:spcBef>
+              <a:buClr>
+                <a:schemeClr val="accent1"/>
+              </a:buClr>
+              <a:buSzPct val="100000"/>
+              <a:buFont typeface="Arial" panose="020B0604020202020204" pitchFamily="34" charset="0"/>
+              <a:buChar char="•"/>
+              <a:defRPr sz="1200" kern="1200" baseline="0">
+                <a:solidFill>
+                  <a:schemeClr val="tx1"/>
+                </a:solidFill>
+                <a:effectLst/>
+                <a:latin typeface="+mn-lt"/>
+                <a:ea typeface="+mn-ea"/>
+                <a:cs typeface="+mn-cs"/>
+              </a:defRPr>
+            </a:lvl9pPr>
+          </a:lstStyle>
+          <a:p>
+            <a:pPr marL="0" indent="0">
+              <a:buNone/>
+            </a:pPr>
+            <a:r>
+              <a:rPr lang="en-US" sz="2800" dirty="0">
+                <a:solidFill>
+                  <a:srgbClr val="F8C533"/>
+                </a:solidFill>
+              </a:rPr>
+              <a:t>1. Wave</a:t>
+            </a:r>
+            <a:endParaRPr lang="en-US" sz="2600" dirty="0"/>
+          </a:p>
+        </p:txBody>
+      </p:sp>
+      <p:sp>
+        <p:nvSpPr>
+          <p:cNvPr id="6" name="Content Placeholder 2">
+            <a:extLst>
+              <a:ext uri="{FF2B5EF4-FFF2-40B4-BE49-F238E27FC236}">
+                <a16:creationId xmlns:a16="http://schemas.microsoft.com/office/drawing/2014/main" id="{8D917BE1-22E9-4FD3-A826-2A4A85262679}"/>
+              </a:ext>
+            </a:extLst>
+          </p:cNvPr>
+          <p:cNvSpPr txBox="1">
+            <a:spLocks/>
+          </p:cNvSpPr>
+          <p:nvPr/>
+        </p:nvSpPr>
+        <p:spPr>
+          <a:xfrm>
+            <a:off x="1434061" y="4300868"/>
+            <a:ext cx="1749872" cy="700874"/>
+          </a:xfrm>
+          <a:prstGeom prst="rect">
+            <a:avLst/>
+          </a:prstGeom>
+        </p:spPr>
+        <p:txBody>
+          <a:bodyPr vert="horz" lIns="91440" tIns="45720" rIns="91440" bIns="45720" rtlCol="0" anchor="t">
+            <a:normAutofit/>
+          </a:bodyPr>
+          <a:lstStyle>
+            <a:lvl1pPr marL="228600" indent="-228600" algn="l" defTabSz="914400" rtl="0" eaLnBrk="1" latinLnBrk="0" hangingPunct="1">
+              <a:lnSpc>
+                <a:spcPct val="120000"/>
+              </a:lnSpc>
+              <a:spcBef>
+                <a:spcPts val="1000"/>
+              </a:spcBef>
+              <a:buClr>
+                <a:schemeClr val="accent1"/>
+              </a:buClr>
+              <a:buSzPct val="100000"/>
+              <a:buFont typeface="Arial" panose="020B0604020202020204" pitchFamily="34" charset="0"/>
+              <a:buChar char="•"/>
+              <a:defRPr sz="2000" kern="1200">
+                <a:solidFill>
+                  <a:schemeClr val="tx1"/>
+                </a:solidFill>
+                <a:effectLst/>
+                <a:latin typeface="+mn-lt"/>
+                <a:ea typeface="+mn-ea"/>
+                <a:cs typeface="+mn-cs"/>
+              </a:defRPr>
+            </a:lvl1pPr>
+            <a:lvl2pPr marL="685800" indent="-228600" algn="l" defTabSz="914400" rtl="0" eaLnBrk="1" latinLnBrk="0" hangingPunct="1">
+              <a:lnSpc>
+                <a:spcPct val="120000"/>
+              </a:lnSpc>
+              <a:spcBef>
+                <a:spcPts val="500"/>
+              </a:spcBef>
+              <a:buClr>
+                <a:schemeClr val="accent1"/>
+              </a:buClr>
+              <a:buSzPct val="100000"/>
+              <a:buFont typeface="Arial" panose="020B0604020202020204" pitchFamily="34" charset="0"/>
+              <a:buChar char="•"/>
+              <a:defRPr sz="1800" kern="1200" cap="none" baseline="0">
+                <a:solidFill>
+                  <a:schemeClr val="tx1"/>
+                </a:solidFill>
+                <a:effectLst/>
+                <a:latin typeface="+mn-lt"/>
+                <a:ea typeface="+mn-ea"/>
+                <a:cs typeface="+mn-cs"/>
+              </a:defRPr>
+            </a:lvl2pPr>
+            <a:lvl3pPr marL="1143000" indent="-228600" algn="l" defTabSz="914400" rtl="0" eaLnBrk="1" latinLnBrk="0" hangingPunct="1">
+              <a:lnSpc>
+                <a:spcPct val="120000"/>
+              </a:lnSpc>
+              <a:spcBef>
+                <a:spcPts val="500"/>
+              </a:spcBef>
+              <a:buClr>
+                <a:schemeClr val="accent1"/>
+              </a:buClr>
+              <a:buSzPct val="100000"/>
+              <a:buFont typeface="Arial" panose="020B0604020202020204" pitchFamily="34" charset="0"/>
+              <a:buChar char="•"/>
+              <a:defRPr sz="1600" kern="1200">
+                <a:solidFill>
+                  <a:schemeClr val="tx1"/>
+                </a:solidFill>
+                <a:effectLst/>
+                <a:latin typeface="+mn-lt"/>
+                <a:ea typeface="+mn-ea"/>
+                <a:cs typeface="+mn-cs"/>
+              </a:defRPr>
+            </a:lvl3pPr>
+            <a:lvl4pPr marL="1600200" indent="-228600" algn="l" defTabSz="914400" rtl="0" eaLnBrk="1" latinLnBrk="0" hangingPunct="1">
+              <a:lnSpc>
+                <a:spcPct val="120000"/>
+              </a:lnSpc>
+              <a:spcBef>
+                <a:spcPts val="500"/>
+              </a:spcBef>
+              <a:buClr>
+                <a:schemeClr val="accent1"/>
+              </a:buClr>
+              <a:buSzPct val="100000"/>
+              <a:buFont typeface="Arial" panose="020B0604020202020204" pitchFamily="34" charset="0"/>
+              <a:buChar char="•"/>
+              <a:defRPr sz="1400" kern="1200" cap="none" baseline="0">
+                <a:solidFill>
+                  <a:schemeClr val="tx1"/>
+                </a:solidFill>
+                <a:effectLst/>
+                <a:latin typeface="+mn-lt"/>
+                <a:ea typeface="+mn-ea"/>
+                <a:cs typeface="+mn-cs"/>
+              </a:defRPr>
+            </a:lvl4pPr>
+            <a:lvl5pPr marL="2057400" indent="-228600" algn="l" defTabSz="914400" rtl="0" eaLnBrk="1" latinLnBrk="0" hangingPunct="1">
+              <a:lnSpc>
+                <a:spcPct val="120000"/>
+              </a:lnSpc>
+              <a:spcBef>
+                <a:spcPts val="500"/>
+              </a:spcBef>
+              <a:buClr>
+                <a:schemeClr val="accent1"/>
+              </a:buClr>
+              <a:buSzPct val="100000"/>
+              <a:buFont typeface="Arial" panose="020B0604020202020204" pitchFamily="34" charset="0"/>
+              <a:buChar char="•"/>
+              <a:defRPr sz="1200" kern="1200">
+                <a:solidFill>
+                  <a:schemeClr val="tx1"/>
+                </a:solidFill>
+                <a:effectLst/>
+                <a:latin typeface="+mn-lt"/>
+                <a:ea typeface="+mn-ea"/>
+                <a:cs typeface="+mn-cs"/>
+              </a:defRPr>
+            </a:lvl5pPr>
+            <a:lvl6pPr marL="2514600" indent="-228600" algn="l" defTabSz="914400" rtl="0" eaLnBrk="1" latinLnBrk="0" hangingPunct="1">
+              <a:lnSpc>
+                <a:spcPct val="120000"/>
+              </a:lnSpc>
+              <a:spcBef>
+                <a:spcPts val="500"/>
+              </a:spcBef>
+              <a:buClr>
+                <a:schemeClr val="accent1"/>
+              </a:buClr>
+              <a:buSzPct val="100000"/>
+              <a:buFont typeface="Arial" panose="020B0604020202020204" pitchFamily="34" charset="0"/>
+              <a:buChar char="•"/>
+              <a:defRPr sz="1200" kern="1200">
+                <a:solidFill>
+                  <a:schemeClr val="tx1"/>
+                </a:solidFill>
+                <a:effectLst/>
+                <a:latin typeface="+mn-lt"/>
+                <a:ea typeface="+mn-ea"/>
+                <a:cs typeface="+mn-cs"/>
+              </a:defRPr>
+            </a:lvl6pPr>
+            <a:lvl7pPr marL="2971800" indent="-228600" algn="l" defTabSz="914400" rtl="0" eaLnBrk="1" latinLnBrk="0" hangingPunct="1">
+              <a:lnSpc>
+                <a:spcPct val="120000"/>
+              </a:lnSpc>
+              <a:spcBef>
+                <a:spcPts val="500"/>
+              </a:spcBef>
+              <a:buClr>
+                <a:schemeClr val="accent1"/>
+              </a:buClr>
+              <a:buSzPct val="100000"/>
+              <a:buFont typeface="Arial" panose="020B0604020202020204" pitchFamily="34" charset="0"/>
+              <a:buChar char="•"/>
+              <a:defRPr sz="1200" kern="1200">
+                <a:solidFill>
+                  <a:schemeClr val="tx1"/>
+                </a:solidFill>
+                <a:effectLst/>
+                <a:latin typeface="+mn-lt"/>
+                <a:ea typeface="+mn-ea"/>
+                <a:cs typeface="+mn-cs"/>
+              </a:defRPr>
+            </a:lvl7pPr>
+            <a:lvl8pPr marL="3429000" indent="-228600" algn="l" defTabSz="914400" rtl="0" eaLnBrk="1" latinLnBrk="0" hangingPunct="1">
+              <a:lnSpc>
+                <a:spcPct val="120000"/>
+              </a:lnSpc>
+              <a:spcBef>
+                <a:spcPts val="500"/>
+              </a:spcBef>
+              <a:buClr>
+                <a:schemeClr val="accent1"/>
+              </a:buClr>
+              <a:buSzPct val="100000"/>
+              <a:buFont typeface="Arial" panose="020B0604020202020204" pitchFamily="34" charset="0"/>
+              <a:buChar char="•"/>
+              <a:defRPr sz="1200" kern="1200" baseline="0">
+                <a:solidFill>
+                  <a:schemeClr val="tx1"/>
+                </a:solidFill>
+                <a:effectLst/>
+                <a:latin typeface="+mn-lt"/>
+                <a:ea typeface="+mn-ea"/>
+                <a:cs typeface="+mn-cs"/>
+              </a:defRPr>
+            </a:lvl8pPr>
+            <a:lvl9pPr marL="3886200" indent="-228600" algn="l" defTabSz="914400" rtl="0" eaLnBrk="1" latinLnBrk="0" hangingPunct="1">
+              <a:lnSpc>
+                <a:spcPct val="120000"/>
+              </a:lnSpc>
+              <a:spcBef>
+                <a:spcPts val="500"/>
+              </a:spcBef>
+              <a:buClr>
+                <a:schemeClr val="accent1"/>
+              </a:buClr>
+              <a:buSzPct val="100000"/>
+              <a:buFont typeface="Arial" panose="020B0604020202020204" pitchFamily="34" charset="0"/>
+              <a:buChar char="•"/>
+              <a:defRPr sz="1200" kern="1200" baseline="0">
+                <a:solidFill>
+                  <a:schemeClr val="tx1"/>
+                </a:solidFill>
+                <a:effectLst/>
+                <a:latin typeface="+mn-lt"/>
+                <a:ea typeface="+mn-ea"/>
+                <a:cs typeface="+mn-cs"/>
+              </a:defRPr>
+            </a:lvl9pPr>
+          </a:lstStyle>
+          <a:p>
+            <a:pPr marL="0" indent="0">
+              <a:buNone/>
+            </a:pPr>
+            <a:r>
+              <a:rPr lang="en-US" sz="2800" dirty="0">
+                <a:solidFill>
+                  <a:srgbClr val="F8C533"/>
+                </a:solidFill>
+              </a:rPr>
+              <a:t>2/3. Wave</a:t>
+            </a:r>
+          </a:p>
+        </p:txBody>
+      </p:sp>
+      <p:sp>
+        <p:nvSpPr>
+          <p:cNvPr id="15" name="Left Brace 14">
+            <a:extLst>
+              <a:ext uri="{FF2B5EF4-FFF2-40B4-BE49-F238E27FC236}">
+                <a16:creationId xmlns:a16="http://schemas.microsoft.com/office/drawing/2014/main" id="{884920EA-6274-4294-A64F-586CE51950D4}"/>
+              </a:ext>
+            </a:extLst>
+          </p:cNvPr>
+          <p:cNvSpPr/>
+          <p:nvPr/>
+        </p:nvSpPr>
+        <p:spPr>
+          <a:xfrm>
+            <a:off x="3186919" y="4179000"/>
+            <a:ext cx="406400" cy="944611"/>
+          </a:xfrm>
+          <a:prstGeom prst="leftBrace">
+            <a:avLst>
+              <a:gd name="adj1" fmla="val 35000"/>
+              <a:gd name="adj2" fmla="val 50000"/>
+            </a:avLst>
+          </a:prstGeom>
+          <a:ln w="28575">
+            <a:solidFill>
+              <a:srgbClr val="F8C533"/>
+            </a:solidFill>
+          </a:ln>
+        </p:spPr>
+        <p:style>
+          <a:lnRef idx="2">
+            <a:schemeClr val="accent1">
+              <a:shade val="60000"/>
+              <a:hueOff val="0"/>
+              <a:satOff val="0"/>
+              <a:lumOff val="0"/>
+              <a:alphaOff val="0"/>
+            </a:schemeClr>
+          </a:lnRef>
+          <a:fillRef idx="0">
+            <a:schemeClr val="accent1">
+              <a:hueOff val="0"/>
+              <a:satOff val="0"/>
+              <a:lumOff val="0"/>
+              <a:alphaOff val="0"/>
+            </a:schemeClr>
+          </a:fillRef>
+          <a:effectRef idx="0">
+            <a:schemeClr val="accent1">
+              <a:hueOff val="0"/>
+              <a:satOff val="0"/>
+              <a:lumOff val="0"/>
+              <a:alphaOff val="0"/>
+            </a:schemeClr>
+          </a:effectRef>
+          <a:fontRef idx="minor">
+            <a:schemeClr val="tx1">
+              <a:hueOff val="0"/>
+              <a:satOff val="0"/>
+              <a:lumOff val="0"/>
+              <a:alphaOff val="0"/>
+            </a:schemeClr>
+          </a:fontRef>
+        </p:style>
       </p:sp>
     </p:spTree>
     <p:extLst>

</xml_diff>